<commit_message>
figure 1 popwerpoint updates
</commit_message>
<xml_diff>
--- a/preliminary_work/figures/Figure1_powerpoint.pptx
+++ b/preliminary_work/figures/Figure1_powerpoint.pptx
@@ -243,7 +243,7 @@
           <a:p>
             <a:fld id="{51F6C441-3C45-4CDB-93F5-1F8D58FA41B0}" type="datetimeFigureOut">
               <a:rPr lang="en-US" smtClean="0"/>
-              <a:t>5/30/19</a:t>
+              <a:t>7/9/19</a:t>
             </a:fld>
             <a:endParaRPr lang="en-US"/>
           </a:p>
@@ -413,7 +413,7 @@
           <a:p>
             <a:fld id="{51F6C441-3C45-4CDB-93F5-1F8D58FA41B0}" type="datetimeFigureOut">
               <a:rPr lang="en-US" smtClean="0"/>
-              <a:t>5/30/19</a:t>
+              <a:t>7/9/19</a:t>
             </a:fld>
             <a:endParaRPr lang="en-US"/>
           </a:p>
@@ -593,7 +593,7 @@
           <a:p>
             <a:fld id="{51F6C441-3C45-4CDB-93F5-1F8D58FA41B0}" type="datetimeFigureOut">
               <a:rPr lang="en-US" smtClean="0"/>
-              <a:t>5/30/19</a:t>
+              <a:t>7/9/19</a:t>
             </a:fld>
             <a:endParaRPr lang="en-US"/>
           </a:p>
@@ -763,7 +763,7 @@
           <a:p>
             <a:fld id="{51F6C441-3C45-4CDB-93F5-1F8D58FA41B0}" type="datetimeFigureOut">
               <a:rPr lang="en-US" smtClean="0"/>
-              <a:t>5/30/19</a:t>
+              <a:t>7/9/19</a:t>
             </a:fld>
             <a:endParaRPr lang="en-US"/>
           </a:p>
@@ -1009,7 +1009,7 @@
           <a:p>
             <a:fld id="{51F6C441-3C45-4CDB-93F5-1F8D58FA41B0}" type="datetimeFigureOut">
               <a:rPr lang="en-US" smtClean="0"/>
-              <a:t>5/30/19</a:t>
+              <a:t>7/9/19</a:t>
             </a:fld>
             <a:endParaRPr lang="en-US"/>
           </a:p>
@@ -1241,7 +1241,7 @@
           <a:p>
             <a:fld id="{51F6C441-3C45-4CDB-93F5-1F8D58FA41B0}" type="datetimeFigureOut">
               <a:rPr lang="en-US" smtClean="0"/>
-              <a:t>5/30/19</a:t>
+              <a:t>7/9/19</a:t>
             </a:fld>
             <a:endParaRPr lang="en-US"/>
           </a:p>
@@ -1608,7 +1608,7 @@
           <a:p>
             <a:fld id="{51F6C441-3C45-4CDB-93F5-1F8D58FA41B0}" type="datetimeFigureOut">
               <a:rPr lang="en-US" smtClean="0"/>
-              <a:t>5/30/19</a:t>
+              <a:t>7/9/19</a:t>
             </a:fld>
             <a:endParaRPr lang="en-US"/>
           </a:p>
@@ -1726,7 +1726,7 @@
           <a:p>
             <a:fld id="{51F6C441-3C45-4CDB-93F5-1F8D58FA41B0}" type="datetimeFigureOut">
               <a:rPr lang="en-US" smtClean="0"/>
-              <a:t>5/30/19</a:t>
+              <a:t>7/9/19</a:t>
             </a:fld>
             <a:endParaRPr lang="en-US"/>
           </a:p>
@@ -1821,7 +1821,7 @@
           <a:p>
             <a:fld id="{51F6C441-3C45-4CDB-93F5-1F8D58FA41B0}" type="datetimeFigureOut">
               <a:rPr lang="en-US" smtClean="0"/>
-              <a:t>5/30/19</a:t>
+              <a:t>7/9/19</a:t>
             </a:fld>
             <a:endParaRPr lang="en-US"/>
           </a:p>
@@ -2098,7 +2098,7 @@
           <a:p>
             <a:fld id="{51F6C441-3C45-4CDB-93F5-1F8D58FA41B0}" type="datetimeFigureOut">
               <a:rPr lang="en-US" smtClean="0"/>
-              <a:t>5/30/19</a:t>
+              <a:t>7/9/19</a:t>
             </a:fld>
             <a:endParaRPr lang="en-US"/>
           </a:p>
@@ -2355,7 +2355,7 @@
           <a:p>
             <a:fld id="{51F6C441-3C45-4CDB-93F5-1F8D58FA41B0}" type="datetimeFigureOut">
               <a:rPr lang="en-US" smtClean="0"/>
-              <a:t>5/30/19</a:t>
+              <a:t>7/9/19</a:t>
             </a:fld>
             <a:endParaRPr lang="en-US"/>
           </a:p>
@@ -2568,7 +2568,7 @@
           <a:p>
             <a:fld id="{51F6C441-3C45-4CDB-93F5-1F8D58FA41B0}" type="datetimeFigureOut">
               <a:rPr lang="en-US" smtClean="0"/>
-              <a:t>5/30/19</a:t>
+              <a:t>7/9/19</a:t>
             </a:fld>
             <a:endParaRPr lang="en-US"/>
           </a:p>
@@ -2973,215 +2973,204 @@
           <a:chExt cx="0" cy="0"/>
         </a:xfrm>
       </p:grpSpPr>
-      <p:grpSp>
-        <p:nvGrpSpPr>
-          <p:cNvPr id="9" name="Group 8"/>
-          <p:cNvGrpSpPr>
-            <a:grpSpLocks/>
-          </p:cNvGrpSpPr>
+      <p:pic>
+        <p:nvPicPr>
+          <p:cNvPr id="3" name="Picture 2">
+            <a:extLst>
+              <a:ext uri="{FF2B5EF4-FFF2-40B4-BE49-F238E27FC236}">
+                <a16:creationId xmlns:a16="http://schemas.microsoft.com/office/drawing/2014/main" id="{B7F94654-7F60-7446-B6CD-101D2C9B371B}"/>
+              </a:ext>
+            </a:extLst>
+          </p:cNvPr>
+          <p:cNvPicPr>
+            <a:picLocks noChangeAspect="1"/>
+          </p:cNvPicPr>
           <p:nvPr/>
-        </p:nvGrpSpPr>
-        <p:grpSpPr>
+        </p:nvPicPr>
+        <p:blipFill>
+          <a:blip r:embed="rId2">
+            <a:extLst>
+              <a:ext uri="{28A0092B-C50C-407E-A947-70E740481C1C}">
+                <a14:useLocalDpi xmlns:a14="http://schemas.microsoft.com/office/drawing/2010/main" val="0"/>
+              </a:ext>
+            </a:extLst>
+          </a:blip>
+          <a:stretch>
+            <a:fillRect/>
+          </a:stretch>
+        </p:blipFill>
+        <p:spPr>
           <a:xfrm>
-            <a:off x="-6" y="-3"/>
-            <a:ext cx="6400813" cy="3200407"/>
-            <a:chOff x="2895593" y="1828796"/>
-            <a:chExt cx="6400813" cy="3200407"/>
+            <a:off x="0" y="-12788"/>
+            <a:ext cx="6400800" cy="3200400"/>
           </a:xfrm>
-        </p:grpSpPr>
-        <p:pic>
-          <p:nvPicPr>
-            <p:cNvPr id="4" name="Picture 3"/>
-            <p:cNvPicPr>
-              <a:picLocks noChangeAspect="1"/>
-            </p:cNvPicPr>
-            <p:nvPr/>
-          </p:nvPicPr>
-          <p:blipFill>
-            <a:blip r:embed="rId2" cstate="print">
-              <a:extLst>
-                <a:ext uri="{28A0092B-C50C-407E-A947-70E740481C1C}">
-                  <a14:useLocalDpi xmlns:a14="http://schemas.microsoft.com/office/drawing/2010/main" val="0"/>
-                </a:ext>
-              </a:extLst>
-            </a:blip>
-            <a:stretch>
-              <a:fillRect/>
-            </a:stretch>
-          </p:blipFill>
-          <p:spPr>
-            <a:xfrm>
-              <a:off x="2895593" y="1828796"/>
-              <a:ext cx="6400813" cy="3200407"/>
-            </a:xfrm>
-            <a:prstGeom prst="rect">
-              <a:avLst/>
-            </a:prstGeom>
-          </p:spPr>
-        </p:pic>
-        <p:sp>
-          <p:nvSpPr>
-            <p:cNvPr id="5" name="Down Arrow 4"/>
-            <p:cNvSpPr/>
-            <p:nvPr/>
-          </p:nvSpPr>
-          <p:spPr>
-            <a:xfrm>
-              <a:off x="3175463" y="4081547"/>
-              <a:ext cx="170411" cy="432262"/>
-            </a:xfrm>
-            <a:prstGeom prst="downArrow">
-              <a:avLst/>
-            </a:prstGeom>
+          <a:prstGeom prst="rect">
+            <a:avLst/>
+          </a:prstGeom>
+        </p:spPr>
+      </p:pic>
+      <p:sp>
+        <p:nvSpPr>
+          <p:cNvPr id="5" name="Down Arrow 4"/>
+          <p:cNvSpPr/>
+          <p:nvPr/>
+        </p:nvSpPr>
+        <p:spPr>
+          <a:xfrm>
+            <a:off x="279864" y="2252748"/>
+            <a:ext cx="170411" cy="432262"/>
+          </a:xfrm>
+          <a:prstGeom prst="downArrow">
+            <a:avLst/>
+          </a:prstGeom>
+          <a:solidFill>
+            <a:schemeClr val="tx1"/>
+          </a:solidFill>
+          <a:ln>
             <a:solidFill>
               <a:schemeClr val="tx1"/>
             </a:solidFill>
-            <a:ln>
-              <a:solidFill>
-                <a:schemeClr val="tx1"/>
-              </a:solidFill>
-            </a:ln>
-          </p:spPr>
-          <p:style>
-            <a:lnRef idx="2">
-              <a:schemeClr val="accent1">
-                <a:shade val="50000"/>
-              </a:schemeClr>
-            </a:lnRef>
-            <a:fillRef idx="1">
-              <a:schemeClr val="accent1"/>
-            </a:fillRef>
-            <a:effectRef idx="0">
-              <a:schemeClr val="accent1"/>
-            </a:effectRef>
-            <a:fontRef idx="minor">
-              <a:schemeClr val="lt1"/>
-            </a:fontRef>
-          </p:style>
-          <p:txBody>
-            <a:bodyPr rtlCol="0" anchor="ctr"/>
-            <a:lstStyle/>
-            <a:p>
-              <a:pPr algn="ctr"/>
-              <a:endParaRPr lang="en-US"/>
-            </a:p>
-          </p:txBody>
-        </p:sp>
-        <p:sp>
-          <p:nvSpPr>
-            <p:cNvPr id="6" name="Down Arrow 5"/>
-            <p:cNvSpPr/>
-            <p:nvPr/>
-          </p:nvSpPr>
-          <p:spPr>
-            <a:xfrm rot="10800000">
-              <a:off x="3175462" y="3618805"/>
-              <a:ext cx="170411" cy="432262"/>
-            </a:xfrm>
-            <a:prstGeom prst="downArrow">
-              <a:avLst/>
-            </a:prstGeom>
+          </a:ln>
+        </p:spPr>
+        <p:style>
+          <a:lnRef idx="2">
+            <a:schemeClr val="accent1">
+              <a:shade val="50000"/>
+            </a:schemeClr>
+          </a:lnRef>
+          <a:fillRef idx="1">
+            <a:schemeClr val="accent1"/>
+          </a:fillRef>
+          <a:effectRef idx="0">
+            <a:schemeClr val="accent1"/>
+          </a:effectRef>
+          <a:fontRef idx="minor">
+            <a:schemeClr val="lt1"/>
+          </a:fontRef>
+        </p:style>
+        <p:txBody>
+          <a:bodyPr rtlCol="0" anchor="ctr"/>
+          <a:lstStyle/>
+          <a:p>
+            <a:pPr algn="ctr"/>
+            <a:endParaRPr lang="en-US"/>
+          </a:p>
+        </p:txBody>
+      </p:sp>
+      <p:sp>
+        <p:nvSpPr>
+          <p:cNvPr id="6" name="Down Arrow 5"/>
+          <p:cNvSpPr/>
+          <p:nvPr/>
+        </p:nvSpPr>
+        <p:spPr>
+          <a:xfrm rot="10800000">
+            <a:off x="279863" y="1790006"/>
+            <a:ext cx="170411" cy="432262"/>
+          </a:xfrm>
+          <a:prstGeom prst="downArrow">
+            <a:avLst/>
+          </a:prstGeom>
+          <a:solidFill>
+            <a:schemeClr val="tx1"/>
+          </a:solidFill>
+          <a:ln>
             <a:solidFill>
               <a:schemeClr val="tx1"/>
             </a:solidFill>
-            <a:ln>
-              <a:solidFill>
-                <a:schemeClr val="tx1"/>
-              </a:solidFill>
-            </a:ln>
-          </p:spPr>
-          <p:style>
-            <a:lnRef idx="2">
-              <a:schemeClr val="accent1">
-                <a:shade val="50000"/>
-              </a:schemeClr>
-            </a:lnRef>
-            <a:fillRef idx="1">
-              <a:schemeClr val="accent1"/>
-            </a:fillRef>
-            <a:effectRef idx="0">
-              <a:schemeClr val="accent1"/>
-            </a:effectRef>
-            <a:fontRef idx="minor">
-              <a:schemeClr val="lt1"/>
-            </a:fontRef>
-          </p:style>
-          <p:txBody>
-            <a:bodyPr rtlCol="0" anchor="ctr"/>
-            <a:lstStyle/>
-            <a:p>
-              <a:pPr algn="ctr"/>
-              <a:endParaRPr lang="en-US"/>
-            </a:p>
-          </p:txBody>
-        </p:sp>
-        <p:sp>
-          <p:nvSpPr>
-            <p:cNvPr id="7" name="TextBox 6"/>
-            <p:cNvSpPr txBox="1"/>
-            <p:nvPr/>
-          </p:nvSpPr>
-          <p:spPr>
-            <a:xfrm rot="16200000">
-              <a:off x="2948891" y="3735287"/>
-              <a:ext cx="623455" cy="184666"/>
-            </a:xfrm>
-            <a:prstGeom prst="rect">
-              <a:avLst/>
-            </a:prstGeom>
-            <a:noFill/>
-          </p:spPr>
-          <p:txBody>
-            <a:bodyPr wrap="square" rtlCol="0">
-              <a:spAutoFit/>
-            </a:bodyPr>
-            <a:lstStyle/>
-            <a:p>
-              <a:r>
-                <a:rPr lang="en-US" sz="600" dirty="0">
-                  <a:solidFill>
-                    <a:schemeClr val="bg1"/>
-                  </a:solidFill>
-                </a:rPr>
-                <a:t>KR Exclosure</a:t>
-              </a:r>
-            </a:p>
-          </p:txBody>
-        </p:sp>
-        <p:sp>
-          <p:nvSpPr>
-            <p:cNvPr id="8" name="TextBox 7"/>
-            <p:cNvSpPr txBox="1"/>
-            <p:nvPr/>
-          </p:nvSpPr>
-          <p:spPr>
-            <a:xfrm rot="16200000">
-              <a:off x="2991916" y="4118751"/>
-              <a:ext cx="536171" cy="184666"/>
-            </a:xfrm>
-            <a:prstGeom prst="rect">
-              <a:avLst/>
-            </a:prstGeom>
-            <a:noFill/>
-          </p:spPr>
-          <p:txBody>
-            <a:bodyPr wrap="square" rtlCol="0">
-              <a:spAutoFit/>
-            </a:bodyPr>
-            <a:lstStyle/>
-            <a:p>
-              <a:r>
-                <a:rPr lang="en-US" sz="600" dirty="0">
-                  <a:solidFill>
-                    <a:schemeClr val="bg1"/>
-                  </a:solidFill>
-                </a:rPr>
-                <a:t>Control</a:t>
-              </a:r>
-            </a:p>
-          </p:txBody>
-        </p:sp>
-      </p:grpSp>
+          </a:ln>
+        </p:spPr>
+        <p:style>
+          <a:lnRef idx="2">
+            <a:schemeClr val="accent1">
+              <a:shade val="50000"/>
+            </a:schemeClr>
+          </a:lnRef>
+          <a:fillRef idx="1">
+            <a:schemeClr val="accent1"/>
+          </a:fillRef>
+          <a:effectRef idx="0">
+            <a:schemeClr val="accent1"/>
+          </a:effectRef>
+          <a:fontRef idx="minor">
+            <a:schemeClr val="lt1"/>
+          </a:fontRef>
+        </p:style>
+        <p:txBody>
+          <a:bodyPr rtlCol="0" anchor="ctr"/>
+          <a:lstStyle/>
+          <a:p>
+            <a:pPr algn="ctr"/>
+            <a:endParaRPr lang="en-US"/>
+          </a:p>
+        </p:txBody>
+      </p:sp>
+      <p:sp>
+        <p:nvSpPr>
+          <p:cNvPr id="7" name="TextBox 6"/>
+          <p:cNvSpPr txBox="1"/>
+          <p:nvPr/>
+        </p:nvSpPr>
+        <p:spPr>
+          <a:xfrm rot="16200000">
+            <a:off x="53292" y="1906488"/>
+            <a:ext cx="623455" cy="184666"/>
+          </a:xfrm>
+          <a:prstGeom prst="rect">
+            <a:avLst/>
+          </a:prstGeom>
+          <a:noFill/>
+        </p:spPr>
+        <p:txBody>
+          <a:bodyPr wrap="square" rtlCol="0">
+            <a:spAutoFit/>
+          </a:bodyPr>
+          <a:lstStyle/>
+          <a:p>
+            <a:r>
+              <a:rPr lang="en-US" sz="600" dirty="0">
+                <a:solidFill>
+                  <a:schemeClr val="bg1"/>
+                </a:solidFill>
+              </a:rPr>
+              <a:t>KR Exclosure</a:t>
+            </a:r>
+          </a:p>
+        </p:txBody>
+      </p:sp>
+      <p:sp>
+        <p:nvSpPr>
+          <p:cNvPr id="8" name="TextBox 7"/>
+          <p:cNvSpPr txBox="1"/>
+          <p:nvPr/>
+        </p:nvSpPr>
+        <p:spPr>
+          <a:xfrm rot="16200000">
+            <a:off x="96317" y="2289952"/>
+            <a:ext cx="536171" cy="184666"/>
+          </a:xfrm>
+          <a:prstGeom prst="rect">
+            <a:avLst/>
+          </a:prstGeom>
+          <a:noFill/>
+        </p:spPr>
+        <p:txBody>
+          <a:bodyPr wrap="square" rtlCol="0">
+            <a:spAutoFit/>
+          </a:bodyPr>
+          <a:lstStyle/>
+          <a:p>
+            <a:r>
+              <a:rPr lang="en-US" sz="600" dirty="0">
+                <a:solidFill>
+                  <a:schemeClr val="bg1"/>
+                </a:solidFill>
+              </a:rPr>
+              <a:t>Control</a:t>
+            </a:r>
+          </a:p>
+        </p:txBody>
+      </p:sp>
     </p:spTree>
     <p:extLst>
       <p:ext uri="{BB962C8B-B14F-4D97-AF65-F5344CB8AC3E}">

</xml_diff>